<commit_message>
adding april 7 slides
</commit_message>
<xml_diff>
--- a/slides/april_5.pptx
+++ b/slides/april_5.pptx
@@ -122,6 +122,11 @@
       </a:defRPr>
     </a:lvl9pPr>
   </p:defaultTextStyle>
+  <p:extLst>
+    <p:ext uri="{EFAFB233-063F-42B5-8137-9DF3F51BA10A}">
+      <p15:sldGuideLst xmlns:p15="http://schemas.microsoft.com/office/powerpoint/2012/main"/>
+    </p:ext>
+  </p:extLst>
 </p:presentation>
 </file>
 
@@ -10852,7 +10857,7 @@
           <a:p>
             <a:fld id="{53BEF823-48A5-43FC-BE03-E79964288B41}" type="datetimeFigureOut">
               <a:rPr lang="en-US" smtClean="0"/>
-              <a:t>4/4/23</a:t>
+              <a:t>4/5/23</a:t>
             </a:fld>
             <a:endParaRPr lang="en-US" dirty="0"/>
           </a:p>
@@ -11063,7 +11068,7 @@
             <a:fld id="{53BEF823-48A5-43FC-BE03-E79964288B41}" type="datetimeFigureOut">
               <a:rPr lang="en-US" smtClean="0"/>
               <a:pPr algn="r"/>
-              <a:t>4/4/23</a:t>
+              <a:t>4/5/23</a:t>
             </a:fld>
             <a:endParaRPr lang="en-US" dirty="0"/>
           </a:p>
@@ -11278,7 +11283,7 @@
             <a:fld id="{53BEF823-48A5-43FC-BE03-E79964288B41}" type="datetimeFigureOut">
               <a:rPr lang="en-US" smtClean="0"/>
               <a:pPr algn="r"/>
-              <a:t>4/4/23</a:t>
+              <a:t>4/5/23</a:t>
             </a:fld>
             <a:endParaRPr lang="en-US" dirty="0"/>
           </a:p>
@@ -11481,7 +11486,7 @@
             <a:fld id="{53BEF823-48A5-43FC-BE03-E79964288B41}" type="datetimeFigureOut">
               <a:rPr lang="en-US" smtClean="0"/>
               <a:pPr algn="r"/>
-              <a:t>4/4/23</a:t>
+              <a:t>4/5/23</a:t>
             </a:fld>
             <a:endParaRPr lang="en-US" dirty="0"/>
           </a:p>
@@ -11765,7 +11770,7 @@
             <a:fld id="{53BEF823-48A5-43FC-BE03-E79964288B41}" type="datetimeFigureOut">
               <a:rPr lang="en-US" smtClean="0"/>
               <a:pPr algn="r"/>
-              <a:t>4/4/23</a:t>
+              <a:t>4/5/23</a:t>
             </a:fld>
             <a:endParaRPr lang="en-US" dirty="0"/>
           </a:p>
@@ -12009,7 +12014,7 @@
             <a:fld id="{53BEF823-48A5-43FC-BE03-E79964288B41}" type="datetimeFigureOut">
               <a:rPr lang="en-US" smtClean="0"/>
               <a:pPr algn="r"/>
-              <a:t>4/4/23</a:t>
+              <a:t>4/5/23</a:t>
             </a:fld>
             <a:endParaRPr lang="en-US" dirty="0"/>
           </a:p>
@@ -12452,7 +12457,7 @@
             <a:fld id="{53BEF823-48A5-43FC-BE03-E79964288B41}" type="datetimeFigureOut">
               <a:rPr lang="en-US" smtClean="0"/>
               <a:pPr algn="r"/>
-              <a:t>4/4/23</a:t>
+              <a:t>4/5/23</a:t>
             </a:fld>
             <a:endParaRPr lang="en-US" dirty="0"/>
           </a:p>
@@ -12598,7 +12603,7 @@
             <a:fld id="{53BEF823-48A5-43FC-BE03-E79964288B41}" type="datetimeFigureOut">
               <a:rPr lang="en-US" smtClean="0"/>
               <a:pPr algn="r"/>
-              <a:t>4/4/23</a:t>
+              <a:t>4/5/23</a:t>
             </a:fld>
             <a:endParaRPr lang="en-US" dirty="0"/>
           </a:p>
@@ -12716,7 +12721,7 @@
             <a:fld id="{53BEF823-48A5-43FC-BE03-E79964288B41}" type="datetimeFigureOut">
               <a:rPr lang="en-US" smtClean="0"/>
               <a:pPr algn="r"/>
-              <a:t>4/4/23</a:t>
+              <a:t>4/5/23</a:t>
             </a:fld>
             <a:endParaRPr lang="en-US" dirty="0"/>
           </a:p>
@@ -13000,7 +13005,7 @@
             <a:fld id="{53BEF823-48A5-43FC-BE03-E79964288B41}" type="datetimeFigureOut">
               <a:rPr lang="en-US" smtClean="0"/>
               <a:pPr algn="r"/>
-              <a:t>4/4/23</a:t>
+              <a:t>4/5/23</a:t>
             </a:fld>
             <a:endParaRPr lang="en-US" dirty="0"/>
           </a:p>
@@ -13295,7 +13300,7 @@
             <a:fld id="{53BEF823-48A5-43FC-BE03-E79964288B41}" type="datetimeFigureOut">
               <a:rPr lang="en-US" smtClean="0"/>
               <a:pPr algn="r"/>
-              <a:t>4/4/23</a:t>
+              <a:t>4/5/23</a:t>
             </a:fld>
             <a:endParaRPr lang="en-US" dirty="0"/>
           </a:p>
@@ -13790,7 +13795,7 @@
             <a:fld id="{53BEF823-48A5-43FC-BE03-E79964288B41}" type="datetimeFigureOut">
               <a:rPr lang="en-US" smtClean="0"/>
               <a:pPr algn="r"/>
-              <a:t>4/4/23</a:t>
+              <a:t>4/5/23</a:t>
             </a:fld>
             <a:endParaRPr lang="en-US" dirty="0"/>
           </a:p>
@@ -16317,7 +16322,7 @@
         </p:spPr>
         <p:txBody>
           <a:bodyPr>
-            <a:normAutofit fontScale="85000" lnSpcReduction="20000"/>
+            <a:normAutofit fontScale="85000" lnSpcReduction="10000"/>
           </a:bodyPr>
           <a:lstStyle/>
           <a:p>
@@ -16335,7 +16340,7 @@
             </a:pPr>
             <a:r>
               <a:rPr lang="en-US" sz="2000" dirty="0"/>
-              <a:t> First sentence captures’ readers attention with statistic/fact</a:t>
+              <a:t> First sentence captures’ readers attention </a:t>
             </a:r>
           </a:p>
           <a:p>
@@ -16343,8 +16348,12 @@
               <a:buAutoNum type="alphaUcPeriod"/>
             </a:pPr>
             <a:r>
+              <a:rPr lang="en-US" dirty="0"/>
+              <a:t> </a:t>
+            </a:r>
+            <a:r>
               <a:rPr lang="en-US" sz="2000" dirty="0"/>
-              <a:t> Establishes importance of topic</a:t>
+              <a:t>Establishes importance of topic</a:t>
             </a:r>
           </a:p>
           <a:p>
@@ -16461,7 +16470,7 @@
         </p:nvSpPr>
         <p:spPr>
           <a:xfrm>
-            <a:off x="6096000" y="1420689"/>
+            <a:off x="6096000" y="1528973"/>
             <a:ext cx="5887454" cy="4539704"/>
           </a:xfrm>
           <a:prstGeom prst="rect">
@@ -16476,7 +16485,14 @@
           <a:lstStyle/>
           <a:p>
             <a:r>
-              <a:rPr lang="en-US" sz="1700" dirty="0"/>
+              <a:rPr lang="en-US" sz="1700" dirty="0">
+                <a:solidFill>
+                  <a:schemeClr val="tx1">
+                    <a:lumMod val="85000"/>
+                    <a:lumOff val="15000"/>
+                  </a:schemeClr>
+                </a:solidFill>
+              </a:rPr>
               <a:t>III.  Second Theme (bucket of similar/contradicting findings)</a:t>
             </a:r>
           </a:p>
@@ -16486,7 +16502,14 @@
               <a:buAutoNum type="alphaUcPeriod"/>
             </a:pPr>
             <a:r>
-              <a:rPr lang="en-US" sz="1700" dirty="0"/>
+              <a:rPr lang="en-US" sz="1700" dirty="0">
+                <a:solidFill>
+                  <a:schemeClr val="tx1">
+                    <a:lumMod val="85000"/>
+                    <a:lumOff val="15000"/>
+                  </a:schemeClr>
+                </a:solidFill>
+              </a:rPr>
               <a:t>Statement of how some sources are connected</a:t>
             </a:r>
           </a:p>
@@ -16496,7 +16519,14 @@
               <a:buAutoNum type="arabicPeriod"/>
             </a:pPr>
             <a:r>
-              <a:rPr lang="en-US" sz="1700" i="1" dirty="0"/>
+              <a:rPr lang="en-US" sz="1700" i="1" dirty="0">
+                <a:solidFill>
+                  <a:schemeClr val="tx1">
+                    <a:lumMod val="85000"/>
+                    <a:lumOff val="15000"/>
+                  </a:schemeClr>
+                </a:solidFill>
+              </a:rPr>
               <a:t>Cited empirical research</a:t>
             </a:r>
           </a:p>
@@ -16506,7 +16536,14 @@
               <a:buAutoNum type="arabicPeriod"/>
             </a:pPr>
             <a:r>
-              <a:rPr lang="en-US" sz="1700" i="1" dirty="0"/>
+              <a:rPr lang="en-US" sz="1700" i="1" dirty="0">
+                <a:solidFill>
+                  <a:schemeClr val="tx1">
+                    <a:lumMod val="85000"/>
+                    <a:lumOff val="15000"/>
+                  </a:schemeClr>
+                </a:solidFill>
+              </a:rPr>
               <a:t> Different citation of empirical research</a:t>
             </a:r>
           </a:p>
@@ -16516,7 +16553,14 @@
               <a:buAutoNum type="alphaUcPeriod"/>
             </a:pPr>
             <a:r>
-              <a:rPr lang="en-US" sz="1700" dirty="0"/>
+              <a:rPr lang="en-US" sz="1700" dirty="0">
+                <a:solidFill>
+                  <a:schemeClr val="tx1">
+                    <a:lumMod val="85000"/>
+                    <a:lumOff val="15000"/>
+                  </a:schemeClr>
+                </a:solidFill>
+              </a:rPr>
               <a:t>Another common idea in sources</a:t>
             </a:r>
           </a:p>
@@ -16526,7 +16570,14 @@
               <a:buAutoNum type="arabicPeriod"/>
             </a:pPr>
             <a:r>
-              <a:rPr lang="en-US" sz="1700" i="1" dirty="0"/>
+              <a:rPr lang="en-US" sz="1700" i="1" dirty="0">
+                <a:solidFill>
+                  <a:schemeClr val="tx1">
+                    <a:lumMod val="85000"/>
+                    <a:lumOff val="15000"/>
+                  </a:schemeClr>
+                </a:solidFill>
+              </a:rPr>
               <a:t>Cited empirical research</a:t>
             </a:r>
           </a:p>
@@ -16536,17 +16587,38 @@
               <a:buAutoNum type="arabicPeriod"/>
             </a:pPr>
             <a:r>
-              <a:rPr lang="en-US" sz="1700" i="1" dirty="0"/>
+              <a:rPr lang="en-US" sz="1700" i="1" dirty="0">
+                <a:solidFill>
+                  <a:schemeClr val="tx1">
+                    <a:lumMod val="85000"/>
+                    <a:lumOff val="15000"/>
+                  </a:schemeClr>
+                </a:solidFill>
+              </a:rPr>
               <a:t>Different citation of empirical research</a:t>
             </a:r>
           </a:p>
           <a:p>
             <a:pPr marL="803275" lvl="1"/>
-            <a:endParaRPr lang="en-US" sz="1700" dirty="0"/>
+            <a:endParaRPr lang="en-US" sz="1700" dirty="0">
+              <a:solidFill>
+                <a:schemeClr val="tx1">
+                  <a:lumMod val="85000"/>
+                  <a:lumOff val="15000"/>
+                </a:schemeClr>
+              </a:solidFill>
+            </a:endParaRPr>
           </a:p>
           <a:p>
             <a:r>
-              <a:rPr lang="en-US" sz="1700" dirty="0"/>
+              <a:rPr lang="en-US" sz="1700" dirty="0">
+                <a:solidFill>
+                  <a:schemeClr val="tx1">
+                    <a:lumMod val="85000"/>
+                    <a:lumOff val="15000"/>
+                  </a:schemeClr>
+                </a:solidFill>
+              </a:rPr>
               <a:t>IV.  Third Theme (optional)</a:t>
             </a:r>
           </a:p>
@@ -16556,7 +16628,14 @@
               <a:buAutoNum type="alphaUcPeriod"/>
             </a:pPr>
             <a:r>
-              <a:rPr lang="en-US" sz="1700" dirty="0"/>
+              <a:rPr lang="en-US" sz="1700" dirty="0">
+                <a:solidFill>
+                  <a:schemeClr val="tx1">
+                    <a:lumMod val="85000"/>
+                    <a:lumOff val="15000"/>
+                  </a:schemeClr>
+                </a:solidFill>
+              </a:rPr>
               <a:t>Statement of how some sources are connected</a:t>
             </a:r>
           </a:p>
@@ -16566,7 +16645,14 @@
               <a:buAutoNum type="arabicPeriod"/>
             </a:pPr>
             <a:r>
-              <a:rPr lang="en-US" sz="1700" i="1" dirty="0"/>
+              <a:rPr lang="en-US" sz="1700" i="1" dirty="0">
+                <a:solidFill>
+                  <a:schemeClr val="tx1">
+                    <a:lumMod val="85000"/>
+                    <a:lumOff val="15000"/>
+                  </a:schemeClr>
+                </a:solidFill>
+              </a:rPr>
               <a:t> Cited empirical research</a:t>
             </a:r>
           </a:p>
@@ -16576,7 +16662,14 @@
               <a:buAutoNum type="arabicPeriod"/>
             </a:pPr>
             <a:r>
-              <a:rPr lang="en-US" sz="1700" i="1" dirty="0"/>
+              <a:rPr lang="en-US" sz="1700" i="1" dirty="0">
+                <a:solidFill>
+                  <a:schemeClr val="tx1">
+                    <a:lumMod val="85000"/>
+                    <a:lumOff val="15000"/>
+                  </a:schemeClr>
+                </a:solidFill>
+              </a:rPr>
               <a:t> Different citation of empirical research</a:t>
             </a:r>
           </a:p>
@@ -16586,7 +16679,14 @@
               <a:buAutoNum type="alphaUcPeriod"/>
             </a:pPr>
             <a:r>
-              <a:rPr lang="en-US" sz="1700" dirty="0"/>
+              <a:rPr lang="en-US" sz="1700" dirty="0">
+                <a:solidFill>
+                  <a:schemeClr val="tx1">
+                    <a:lumMod val="85000"/>
+                    <a:lumOff val="15000"/>
+                  </a:schemeClr>
+                </a:solidFill>
+              </a:rPr>
               <a:t>Another common idea in sources</a:t>
             </a:r>
           </a:p>
@@ -16596,7 +16696,14 @@
               <a:buAutoNum type="arabicPeriod"/>
             </a:pPr>
             <a:r>
-              <a:rPr lang="en-US" sz="1700" i="1" dirty="0"/>
+              <a:rPr lang="en-US" sz="1700" i="1" dirty="0">
+                <a:solidFill>
+                  <a:schemeClr val="tx1">
+                    <a:lumMod val="85000"/>
+                    <a:lumOff val="15000"/>
+                  </a:schemeClr>
+                </a:solidFill>
+              </a:rPr>
               <a:t>Cited empirical research</a:t>
             </a:r>
           </a:p>
@@ -16606,14 +16713,28 @@
               <a:buAutoNum type="arabicPeriod"/>
             </a:pPr>
             <a:r>
-              <a:rPr lang="en-US" sz="1700" i="1" dirty="0"/>
+              <a:rPr lang="en-US" sz="1700" i="1" dirty="0">
+                <a:solidFill>
+                  <a:schemeClr val="tx1">
+                    <a:lumMod val="85000"/>
+                    <a:lumOff val="15000"/>
+                  </a:schemeClr>
+                </a:solidFill>
+              </a:rPr>
               <a:t> Different citation of empirical research</a:t>
             </a:r>
           </a:p>
           <a:p>
             <a:pPr marL="55563"/>
             <a:r>
-              <a:rPr lang="en-US" sz="1700" dirty="0"/>
+              <a:rPr lang="en-US" sz="1700" dirty="0">
+                <a:solidFill>
+                  <a:schemeClr val="tx1">
+                    <a:lumMod val="85000"/>
+                    <a:lumOff val="15000"/>
+                  </a:schemeClr>
+                </a:solidFill>
+              </a:rPr>
               <a:t>V. Conclusion</a:t>
             </a:r>
           </a:p>
@@ -16911,7 +17032,9 @@
         </p:nvSpPr>
         <p:spPr/>
         <p:txBody>
-          <a:bodyPr/>
+          <a:bodyPr>
+            <a:normAutofit lnSpcReduction="10000"/>
+          </a:bodyPr>
           <a:lstStyle/>
           <a:p>
             <a:r>
@@ -16937,7 +17060,14 @@
             <a:pPr lvl="1"/>
             <a:r>
               <a:rPr lang="en-US" dirty="0"/>
-              <a:t>Major (High / Low value) </a:t>
+              <a:t>GPA</a:t>
+            </a:r>
+          </a:p>
+          <a:p>
+            <a:pPr lvl="1"/>
+            <a:r>
+              <a:rPr lang="en-US" dirty="0"/>
+              <a:t>Major (Easy / hard) </a:t>
             </a:r>
           </a:p>
           <a:p>

</xml_diff>